<commit_message>
Detalles en selectores de atributos
</commit_message>
<xml_diff>
--- a/Presentaciones/Formación Desarrollo Web (CSS).pptx
+++ b/Presentaciones/Formación Desarrollo Web (CSS).pptx
@@ -23833,7 +23833,7 @@
             <p:ph idx="1"/>
             <p:extLst>
               <p:ext uri="{D42A27DB-BD31-4B8C-83A1-F6EECF244321}">
-                <p14:modId xmlns:p14="http://schemas.microsoft.com/office/powerpoint/2010/main" val="3966085935"/>
+                <p14:modId xmlns:p14="http://schemas.microsoft.com/office/powerpoint/2010/main" val="4251032731"/>
               </p:ext>
             </p:extLst>
           </p:nvPr>
@@ -24191,9 +24191,21 @@
                       </a:r>
                       <a:r>
                         <a:rPr lang="es-ES" i="1" baseline="0" dirty="0"/>
-                        <a:t>flor</a:t>
-                      </a:r>
-                      <a:endParaRPr lang="es-ES" i="1" dirty="0"/>
+                        <a:t>flor </a:t>
+                      </a:r>
+                      <a:r>
+                        <a:rPr lang="es-ES" i="0" baseline="0" dirty="0"/>
+                        <a:t>(</a:t>
+                      </a:r>
+                      <a:r>
+                        <a:rPr lang="es-ES" b="1" i="0" baseline="0" dirty="0"/>
+                        <a:t>separada del resto</a:t>
+                      </a:r>
+                      <a:r>
+                        <a:rPr lang="es-ES" i="0" baseline="0" dirty="0"/>
+                        <a:t>)</a:t>
+                      </a:r>
+                      <a:endParaRPr lang="es-ES" i="0" dirty="0"/>
                     </a:p>
                   </a:txBody>
                   <a:tcPr/>

</xml_diff>